<commit_message>
Update screenshots: master -> main
</commit_message>
<xml_diff>
--- a/diagrams/gitAndGithub/branch/branchesAsLabels.pptx
+++ b/diagrams/gitAndGithub/branch/branchesAsLabels.pptx
@@ -210,7 +210,7 @@
           <a:p>
             <a:fld id="{2D7B8176-A568-4DE8-B695-28BCA3CC2636}" type="datetimeFigureOut">
               <a:rPr lang="en-US" smtClean="0"/>
-              <a:t>9/25/25</a:t>
+              <a:t>12/19/25</a:t>
             </a:fld>
             <a:endParaRPr lang="en-US"/>
           </a:p>
@@ -826,7 +826,7 @@
           <a:p>
             <a:fld id="{A1F532DB-2311-4BA7-A4CB-CC15A84E776B}" type="datetimeFigureOut">
               <a:rPr lang="en-SG" smtClean="0"/>
-              <a:t>25/9/25</a:t>
+              <a:t>19/12/25</a:t>
             </a:fld>
             <a:endParaRPr lang="en-SG"/>
           </a:p>
@@ -996,7 +996,7 @@
           <a:p>
             <a:fld id="{A1F532DB-2311-4BA7-A4CB-CC15A84E776B}" type="datetimeFigureOut">
               <a:rPr lang="en-SG" smtClean="0"/>
-              <a:t>25/9/25</a:t>
+              <a:t>19/12/25</a:t>
             </a:fld>
             <a:endParaRPr lang="en-SG"/>
           </a:p>
@@ -1176,7 +1176,7 @@
           <a:p>
             <a:fld id="{A1F532DB-2311-4BA7-A4CB-CC15A84E776B}" type="datetimeFigureOut">
               <a:rPr lang="en-SG" smtClean="0"/>
-              <a:t>25/9/25</a:t>
+              <a:t>19/12/25</a:t>
             </a:fld>
             <a:endParaRPr lang="en-SG"/>
           </a:p>
@@ -1346,7 +1346,7 @@
           <a:p>
             <a:fld id="{A1F532DB-2311-4BA7-A4CB-CC15A84E776B}" type="datetimeFigureOut">
               <a:rPr lang="en-SG" smtClean="0"/>
-              <a:t>25/9/25</a:t>
+              <a:t>19/12/25</a:t>
             </a:fld>
             <a:endParaRPr lang="en-SG"/>
           </a:p>
@@ -1592,7 +1592,7 @@
           <a:p>
             <a:fld id="{A1F532DB-2311-4BA7-A4CB-CC15A84E776B}" type="datetimeFigureOut">
               <a:rPr lang="en-SG" smtClean="0"/>
-              <a:t>25/9/25</a:t>
+              <a:t>19/12/25</a:t>
             </a:fld>
             <a:endParaRPr lang="en-SG"/>
           </a:p>
@@ -1880,7 +1880,7 @@
           <a:p>
             <a:fld id="{A1F532DB-2311-4BA7-A4CB-CC15A84E776B}" type="datetimeFigureOut">
               <a:rPr lang="en-SG" smtClean="0"/>
-              <a:t>25/9/25</a:t>
+              <a:t>19/12/25</a:t>
             </a:fld>
             <a:endParaRPr lang="en-SG"/>
           </a:p>
@@ -2302,7 +2302,7 @@
           <a:p>
             <a:fld id="{A1F532DB-2311-4BA7-A4CB-CC15A84E776B}" type="datetimeFigureOut">
               <a:rPr lang="en-SG" smtClean="0"/>
-              <a:t>25/9/25</a:t>
+              <a:t>19/12/25</a:t>
             </a:fld>
             <a:endParaRPr lang="en-SG"/>
           </a:p>
@@ -2420,7 +2420,7 @@
           <a:p>
             <a:fld id="{A1F532DB-2311-4BA7-A4CB-CC15A84E776B}" type="datetimeFigureOut">
               <a:rPr lang="en-SG" smtClean="0"/>
-              <a:t>25/9/25</a:t>
+              <a:t>19/12/25</a:t>
             </a:fld>
             <a:endParaRPr lang="en-SG"/>
           </a:p>
@@ -2515,7 +2515,7 @@
           <a:p>
             <a:fld id="{A1F532DB-2311-4BA7-A4CB-CC15A84E776B}" type="datetimeFigureOut">
               <a:rPr lang="en-SG" smtClean="0"/>
-              <a:t>25/9/25</a:t>
+              <a:t>19/12/25</a:t>
             </a:fld>
             <a:endParaRPr lang="en-SG"/>
           </a:p>
@@ -2792,7 +2792,7 @@
           <a:p>
             <a:fld id="{A1F532DB-2311-4BA7-A4CB-CC15A84E776B}" type="datetimeFigureOut">
               <a:rPr lang="en-SG" smtClean="0"/>
-              <a:t>25/9/25</a:t>
+              <a:t>19/12/25</a:t>
             </a:fld>
             <a:endParaRPr lang="en-SG"/>
           </a:p>
@@ -3045,7 +3045,7 @@
           <a:p>
             <a:fld id="{A1F532DB-2311-4BA7-A4CB-CC15A84E776B}" type="datetimeFigureOut">
               <a:rPr lang="en-SG" smtClean="0"/>
-              <a:t>25/9/25</a:t>
+              <a:t>19/12/25</a:t>
             </a:fld>
             <a:endParaRPr lang="en-SG"/>
           </a:p>
@@ -3258,7 +3258,7 @@
           <a:p>
             <a:fld id="{A1F532DB-2311-4BA7-A4CB-CC15A84E776B}" type="datetimeFigureOut">
               <a:rPr lang="en-SG" smtClean="0"/>
-              <a:t>25/9/25</a:t>
+              <a:t>19/12/25</a:t>
             </a:fld>
             <a:endParaRPr lang="en-SG"/>
           </a:p>
@@ -3780,7 +3780,7 @@
                 <a:ea typeface="+mn-ea"/>
                 <a:cs typeface="+mn-cs"/>
               </a:rPr>
-              <a:t>master</a:t>
+              <a:t> main</a:t>
             </a:r>
           </a:p>
         </p:txBody>
@@ -4161,7 +4161,7 @@
                 <a:ea typeface="+mn-ea"/>
                 <a:cs typeface="+mn-cs"/>
               </a:rPr>
-              <a:t>master</a:t>
+              <a:t> main</a:t>
             </a:r>
           </a:p>
         </p:txBody>
@@ -4542,7 +4542,7 @@
                 <a:ea typeface="+mn-ea"/>
                 <a:cs typeface="+mn-cs"/>
               </a:rPr>
-              <a:t>master</a:t>
+              <a:t> main</a:t>
             </a:r>
           </a:p>
         </p:txBody>
@@ -5161,7 +5161,7 @@
                 <a:ea typeface="+mn-ea"/>
                 <a:cs typeface="+mn-cs"/>
               </a:rPr>
-              <a:t>master</a:t>
+              <a:t> main</a:t>
             </a:r>
           </a:p>
         </p:txBody>
@@ -5986,7 +5986,7 @@
                     <a:ea typeface="+mn-ea"/>
                     <a:cs typeface="+mn-cs"/>
                   </a:rPr>
-                  <a:t>master</a:t>
+                  <a:t> main</a:t>
                 </a:r>
               </a:p>
             </p:txBody>
@@ -7163,7 +7163,7 @@
                     <a:ea typeface="+mn-ea"/>
                     <a:cs typeface="+mn-cs"/>
                   </a:rPr>
-                  <a:t>master</a:t>
+                  <a:t> main</a:t>
                 </a:r>
               </a:p>
             </p:txBody>
@@ -7817,7 +7817,7 @@
                     <a:ea typeface="+mn-ea"/>
                     <a:cs typeface="+mn-cs"/>
                   </a:rPr>
-                  <a:t>master</a:t>
+                  <a:t> main</a:t>
                 </a:r>
               </a:p>
             </p:txBody>
@@ -8183,7 +8183,7 @@
                   <a:ea typeface="+mn-ea"/>
                   <a:cs typeface="+mn-cs"/>
                 </a:rPr>
-                <a:t>master</a:t>
+                <a:t> main</a:t>
               </a:r>
             </a:p>
           </p:txBody>
@@ -10064,7 +10064,7 @@
                   <a:ea typeface="+mn-ea"/>
                   <a:cs typeface="+mn-cs"/>
                 </a:rPr>
-                <a:t>master</a:t>
+                <a:t> main</a:t>
               </a:r>
             </a:p>
           </p:txBody>
@@ -11082,7 +11082,7 @@
                   <a:ea typeface="+mn-ea"/>
                   <a:cs typeface="+mn-cs"/>
                 </a:rPr>
-                <a:t>master</a:t>
+                <a:t> main</a:t>
               </a:r>
             </a:p>
           </p:txBody>

</xml_diff>